<commit_message>
update prd role related policy
</commit_message>
<xml_diff>
--- a/doc/prd.pptx
+++ b/doc/prd.pptx
@@ -3145,11 +3145,7 @@
             </a:r>
             <a:r>
               <a:rPr lang="zh-CN" altLang="en-US" dirty="0" smtClean="0"/>
-              <a:t>够创</a:t>
-            </a:r>
-            <a:r>
-              <a:rPr lang="zh-CN" altLang="en-US" dirty="0" smtClean="0"/>
-              <a:t>建</a:t>
+              <a:t>够创建</a:t>
             </a:r>
             <a:r>
               <a:rPr lang="zh-CN" altLang="en-US" dirty="0"/>
@@ -3157,11 +3153,7 @@
             </a:r>
             <a:r>
               <a:rPr lang="zh-CN" altLang="en-US" dirty="0" smtClean="0"/>
-              <a:t>角</a:t>
-            </a:r>
-            <a:r>
-              <a:rPr lang="zh-CN" altLang="en-US" dirty="0" smtClean="0"/>
-              <a:t>色</a:t>
+              <a:t>角色</a:t>
             </a:r>
             <a:endParaRPr lang="en-US" altLang="zh-CN" dirty="0" smtClean="0"/>
           </a:p>
@@ -3176,11 +3168,7 @@
             </a:r>
             <a:r>
               <a:rPr lang="zh-CN" altLang="en-US" dirty="0" smtClean="0"/>
-              <a:t>够邀请系统中已有用户通过固定连接加入该角</a:t>
-            </a:r>
-            <a:r>
-              <a:rPr lang="zh-CN" altLang="en-US" dirty="0" smtClean="0"/>
-              <a:t>色</a:t>
+              <a:t>够邀请系统中已有用户通过固定连接加入该角色</a:t>
             </a:r>
             <a:endParaRPr lang="en-US" altLang="zh-CN" dirty="0" smtClean="0"/>
           </a:p>
@@ -3211,7 +3199,96 @@
                   <a:srgbClr val="FF0000"/>
                 </a:solidFill>
               </a:rPr>
-              <a:t>（需定义）</a:t>
+              <a:t>（需定义</a:t>
+            </a:r>
+            <a:r>
+              <a:rPr lang="zh-CN" altLang="en-US" dirty="0" smtClean="0">
+                <a:solidFill>
+                  <a:srgbClr val="FF0000"/>
+                </a:solidFill>
+              </a:rPr>
+              <a:t>）</a:t>
+            </a:r>
+            <a:endParaRPr lang="en-US" altLang="zh-CN" dirty="0" smtClean="0">
+              <a:solidFill>
+                <a:srgbClr val="FF0000"/>
+              </a:solidFill>
+            </a:endParaRPr>
+          </a:p>
+          <a:p>
+            <a:pPr marL="1371600" lvl="2" indent="-457200">
+              <a:buFont typeface="+mj-lt"/>
+              <a:buAutoNum type="arabicPeriod"/>
+            </a:pPr>
+            <a:r>
+              <a:rPr lang="zh-CN" altLang="en-US" dirty="0">
+                <a:solidFill>
+                  <a:srgbClr val="FF0000"/>
+                </a:solidFill>
+              </a:rPr>
+              <a:t>公</a:t>
+            </a:r>
+            <a:r>
+              <a:rPr lang="zh-CN" altLang="en-US" dirty="0" smtClean="0">
+                <a:solidFill>
+                  <a:srgbClr val="FF0000"/>
+                </a:solidFill>
+              </a:rPr>
+              <a:t>司名称</a:t>
+            </a:r>
+            <a:endParaRPr lang="en-US" altLang="zh-CN" dirty="0" smtClean="0">
+              <a:solidFill>
+                <a:srgbClr val="FF0000"/>
+              </a:solidFill>
+            </a:endParaRPr>
+          </a:p>
+          <a:p>
+            <a:pPr marL="1371600" lvl="2" indent="-457200">
+              <a:buFont typeface="+mj-lt"/>
+              <a:buAutoNum type="arabicPeriod"/>
+            </a:pPr>
+            <a:r>
+              <a:rPr lang="zh-CN" altLang="en-US" dirty="0">
+                <a:solidFill>
+                  <a:srgbClr val="FF0000"/>
+                </a:solidFill>
+              </a:rPr>
+              <a:t>产</a:t>
+            </a:r>
+            <a:r>
+              <a:rPr lang="zh-CN" altLang="en-US" dirty="0" smtClean="0">
+                <a:solidFill>
+                  <a:srgbClr val="FF0000"/>
+                </a:solidFill>
+              </a:rPr>
+              <a:t>品数量</a:t>
+            </a:r>
+            <a:endParaRPr lang="en-US" altLang="zh-CN" dirty="0" smtClean="0">
+              <a:solidFill>
+                <a:srgbClr val="FF0000"/>
+              </a:solidFill>
+            </a:endParaRPr>
+          </a:p>
+          <a:p>
+            <a:pPr marL="1371600" lvl="2" indent="-457200">
+              <a:buFont typeface="+mj-lt"/>
+              <a:buAutoNum type="arabicPeriod"/>
+            </a:pPr>
+            <a:r>
+              <a:rPr lang="zh-CN" altLang="en-US" dirty="0">
+                <a:solidFill>
+                  <a:srgbClr val="FF0000"/>
+                </a:solidFill>
+              </a:rPr>
+              <a:t>有</a:t>
+            </a:r>
+            <a:r>
+              <a:rPr lang="zh-CN" altLang="en-US" dirty="0" smtClean="0">
+                <a:solidFill>
+                  <a:srgbClr val="FF0000"/>
+                </a:solidFill>
+              </a:rPr>
+              <a:t>效期</a:t>
             </a:r>
             <a:endParaRPr lang="en-US" altLang="zh-CN" dirty="0" smtClean="0">
               <a:solidFill>
@@ -3324,7 +3401,6 @@
               <a:rPr lang="zh-CN" altLang="en-US" dirty="0"/>
               <a:t>）</a:t>
             </a:r>
-            <a:endParaRPr lang="zh-CN" altLang="en-US" dirty="0"/>
           </a:p>
         </p:txBody>
       </p:sp>
@@ -3381,11 +3457,7 @@
             <a:pPr lvl="1"/>
             <a:r>
               <a:rPr lang="zh-CN" altLang="en-US" dirty="0" smtClean="0"/>
-              <a:t>为了：能够</a:t>
-            </a:r>
-            <a:r>
-              <a:rPr lang="zh-CN" altLang="en-US" dirty="0" smtClean="0"/>
-              <a:t>创建</a:t>
+              <a:t>为了：能够创建</a:t>
             </a:r>
             <a:r>
               <a:rPr lang="en-US" altLang="zh-CN" dirty="0" smtClean="0"/>
@@ -3533,11 +3605,7 @@
           <a:p>
             <a:r>
               <a:rPr lang="zh-CN" altLang="en-US" dirty="0" smtClean="0"/>
-              <a:t>验收条</a:t>
-            </a:r>
-            <a:r>
-              <a:rPr lang="zh-CN" altLang="en-US" dirty="0" smtClean="0"/>
-              <a:t>件</a:t>
+              <a:t>验收条件</a:t>
             </a:r>
             <a:endParaRPr lang="en-US" altLang="zh-CN" dirty="0" smtClean="0"/>
           </a:p>
@@ -3552,11 +3620,7 @@
             </a:r>
             <a:r>
               <a:rPr lang="zh-CN" altLang="en-US" dirty="0" smtClean="0"/>
-              <a:t>够创</a:t>
-            </a:r>
-            <a:r>
-              <a:rPr lang="zh-CN" altLang="en-US" dirty="0" smtClean="0"/>
-              <a:t>建</a:t>
+              <a:t>够创建</a:t>
             </a:r>
             <a:r>
               <a:rPr lang="zh-CN" altLang="en-US" dirty="0"/>
@@ -3572,11 +3636,7 @@
             </a:r>
             <a:r>
               <a:rPr lang="zh-CN" altLang="en-US" dirty="0" smtClean="0"/>
-              <a:t>）角</a:t>
-            </a:r>
-            <a:r>
-              <a:rPr lang="zh-CN" altLang="en-US" dirty="0" smtClean="0"/>
-              <a:t>色</a:t>
+              <a:t>）角色</a:t>
             </a:r>
             <a:endParaRPr lang="en-US" altLang="zh-CN" dirty="0" smtClean="0"/>
           </a:p>
@@ -3591,11 +3651,7 @@
             </a:r>
             <a:r>
               <a:rPr lang="zh-CN" altLang="en-US" dirty="0" smtClean="0"/>
-              <a:t>够邀请系统中已有用户通过固定连接加入该角</a:t>
-            </a:r>
-            <a:r>
-              <a:rPr lang="zh-CN" altLang="en-US" dirty="0" smtClean="0"/>
-              <a:t>色</a:t>
+              <a:t>够邀请系统中已有用户通过固定连接加入该角色</a:t>
             </a:r>
             <a:endParaRPr lang="en-US" altLang="zh-CN" dirty="0" smtClean="0"/>
           </a:p>
@@ -3634,7 +3690,15 @@
                   <a:srgbClr val="FF0000"/>
                 </a:solidFill>
               </a:rPr>
-              <a:t>（需定义）</a:t>
+              <a:t>（需定义</a:t>
+            </a:r>
+            <a:r>
+              <a:rPr lang="zh-CN" altLang="en-US" dirty="0" smtClean="0">
+                <a:solidFill>
+                  <a:srgbClr val="FF0000"/>
+                </a:solidFill>
+              </a:rPr>
+              <a:t>）</a:t>
             </a:r>
             <a:endParaRPr lang="en-US" altLang="zh-CN" dirty="0" smtClean="0">
               <a:solidFill>
@@ -3643,17 +3707,40 @@
             </a:endParaRPr>
           </a:p>
           <a:p>
+            <a:pPr marL="1371600" lvl="2" indent="-457200">
+              <a:buFont typeface="+mj-lt"/>
+              <a:buAutoNum type="arabicPeriod"/>
+            </a:pPr>
+            <a:r>
+              <a:rPr lang="zh-CN" altLang="en-US" dirty="0">
+                <a:solidFill>
+                  <a:srgbClr val="FF0000"/>
+                </a:solidFill>
+              </a:rPr>
+              <a:t>负责区</a:t>
+            </a:r>
+            <a:r>
+              <a:rPr lang="zh-CN" altLang="en-US" dirty="0" smtClean="0">
+                <a:solidFill>
+                  <a:srgbClr val="FF0000"/>
+                </a:solidFill>
+              </a:rPr>
+              <a:t>域名称</a:t>
+            </a:r>
+            <a:endParaRPr lang="en-US" altLang="zh-CN" dirty="0" smtClean="0">
+              <a:solidFill>
+                <a:srgbClr val="FF0000"/>
+              </a:solidFill>
+            </a:endParaRPr>
+          </a:p>
+          <a:p>
             <a:pPr marL="914400" lvl="1" indent="-457200">
               <a:buFont typeface="+mj-lt"/>
               <a:buAutoNum type="arabicPeriod"/>
             </a:pPr>
             <a:r>
               <a:rPr lang="zh-CN" altLang="en-US" dirty="0" smtClean="0"/>
-              <a:t>能</a:t>
-            </a:r>
-            <a:r>
-              <a:rPr lang="zh-CN" altLang="en-US" dirty="0" smtClean="0"/>
-              <a:t>够将当</a:t>
+              <a:t>能够将当</a:t>
             </a:r>
             <a:r>
               <a:rPr lang="zh-CN" altLang="en-US" dirty="0"/>
@@ -3677,11 +3764,7 @@
             </a:r>
             <a:r>
               <a:rPr lang="zh-CN" altLang="en-US" dirty="0" smtClean="0"/>
-              <a:t>色的用户删</a:t>
-            </a:r>
-            <a:r>
-              <a:rPr lang="zh-CN" altLang="en-US" dirty="0" smtClean="0"/>
-              <a:t>除</a:t>
+              <a:t>色的用户删除</a:t>
             </a:r>
             <a:endParaRPr lang="en-US" altLang="zh-CN" dirty="0" smtClean="0"/>
           </a:p>
@@ -3994,11 +4077,7 @@
             </a:r>
             <a:r>
               <a:rPr lang="zh-CN" altLang="en-US" dirty="0" smtClean="0"/>
-              <a:t>够创</a:t>
-            </a:r>
-            <a:r>
-              <a:rPr lang="zh-CN" altLang="en-US" dirty="0" smtClean="0"/>
-              <a:t>建</a:t>
+              <a:t>够创建</a:t>
             </a:r>
             <a:r>
               <a:rPr lang="zh-CN" altLang="en-US" dirty="0"/>
@@ -4006,11 +4085,7 @@
             </a:r>
             <a:r>
               <a:rPr lang="zh-CN" altLang="en-US" dirty="0" smtClean="0"/>
-              <a:t>角</a:t>
-            </a:r>
-            <a:r>
-              <a:rPr lang="zh-CN" altLang="en-US" dirty="0" smtClean="0"/>
-              <a:t>色</a:t>
+              <a:t>角色</a:t>
             </a:r>
             <a:endParaRPr lang="en-US" altLang="zh-CN" dirty="0" smtClean="0"/>
           </a:p>
@@ -4021,15 +4096,7 @@
             </a:pPr>
             <a:r>
               <a:rPr lang="zh-CN" altLang="en-US" dirty="0" smtClean="0"/>
-              <a:t>能</a:t>
-            </a:r>
-            <a:r>
-              <a:rPr lang="zh-CN" altLang="en-US" dirty="0" smtClean="0"/>
-              <a:t>够邀请系统中已有用户通过固定连接加入该角</a:t>
-            </a:r>
-            <a:r>
-              <a:rPr lang="zh-CN" altLang="en-US" dirty="0" smtClean="0"/>
-              <a:t>色</a:t>
+              <a:t>能够邀请系统中已有用户通过固定连接加入该角色</a:t>
             </a:r>
             <a:endParaRPr lang="en-US" altLang="zh-CN" dirty="0" smtClean="0"/>
           </a:p>
@@ -4060,7 +4127,15 @@
                   <a:srgbClr val="FF0000"/>
                 </a:solidFill>
               </a:rPr>
-              <a:t>（需定义）</a:t>
+              <a:t>（需定义</a:t>
+            </a:r>
+            <a:r>
+              <a:rPr lang="zh-CN" altLang="en-US" dirty="0" smtClean="0">
+                <a:solidFill>
+                  <a:srgbClr val="FF0000"/>
+                </a:solidFill>
+              </a:rPr>
+              <a:t>）</a:t>
             </a:r>
             <a:endParaRPr lang="en-US" altLang="zh-CN" dirty="0" smtClean="0">
               <a:solidFill>
@@ -4069,37 +4144,40 @@
             </a:endParaRPr>
           </a:p>
           <a:p>
+            <a:pPr marL="1371600" lvl="2" indent="-457200">
+              <a:buFont typeface="+mj-lt"/>
+              <a:buAutoNum type="arabicPeriod"/>
+            </a:pPr>
+            <a:r>
+              <a:rPr lang="zh-CN" altLang="en-US" dirty="0">
+                <a:solidFill>
+                  <a:srgbClr val="FF0000"/>
+                </a:solidFill>
+              </a:rPr>
+              <a:t>药</a:t>
+            </a:r>
+            <a:r>
+              <a:rPr lang="zh-CN" altLang="en-US" dirty="0" smtClean="0">
+                <a:solidFill>
+                  <a:srgbClr val="FF0000"/>
+                </a:solidFill>
+              </a:rPr>
+              <a:t>店名称（促销员的别称）</a:t>
+            </a:r>
+            <a:endParaRPr lang="en-US" altLang="zh-CN" dirty="0" smtClean="0">
+              <a:solidFill>
+                <a:srgbClr val="FF0000"/>
+              </a:solidFill>
+            </a:endParaRPr>
+          </a:p>
+          <a:p>
             <a:pPr marL="914400" lvl="1" indent="-457200">
               <a:buFont typeface="+mj-lt"/>
               <a:buAutoNum type="arabicPeriod"/>
             </a:pPr>
             <a:r>
               <a:rPr lang="zh-CN" altLang="en-US" dirty="0" smtClean="0"/>
-              <a:t>能够添加</a:t>
-            </a:r>
-            <a:r>
-              <a:rPr lang="en-US" altLang="zh-CN" dirty="0" smtClean="0"/>
-              <a:t>/</a:t>
-            </a:r>
-            <a:r>
-              <a:rPr lang="zh-CN" altLang="en-US" dirty="0"/>
-              <a:t>修</a:t>
-            </a:r>
-            <a:r>
-              <a:rPr lang="zh-CN" altLang="en-US" dirty="0" smtClean="0"/>
-              <a:t>改</a:t>
-            </a:r>
-            <a:r>
-              <a:rPr lang="zh-CN" altLang="en-US" dirty="0"/>
-              <a:t>药店（促销员）</a:t>
-            </a:r>
-            <a:r>
-              <a:rPr lang="zh-CN" altLang="en-US" dirty="0" smtClean="0"/>
-              <a:t>角</a:t>
-            </a:r>
-            <a:r>
-              <a:rPr lang="zh-CN" altLang="en-US" dirty="0" smtClean="0"/>
-              <a:t>色的有效期</a:t>
+              <a:t>能够查看下属药店（促销员）角色列表</a:t>
             </a:r>
             <a:endParaRPr lang="en-US" altLang="zh-CN" dirty="0" smtClean="0"/>
           </a:p>
@@ -4109,16 +4187,12 @@
               <a:buAutoNum type="arabicPeriod"/>
             </a:pPr>
             <a:r>
-              <a:rPr lang="zh-CN" altLang="en-US" dirty="0"/>
+              <a:rPr lang="zh-CN" altLang="en-US" dirty="0" smtClean="0"/>
               <a:t>能</a:t>
             </a:r>
             <a:r>
               <a:rPr lang="zh-CN" altLang="en-US" dirty="0" smtClean="0"/>
-              <a:t>够将当</a:t>
-            </a:r>
-            <a:r>
-              <a:rPr lang="zh-CN" altLang="en-US" dirty="0" smtClean="0"/>
-              <a:t>前</a:t>
+              <a:t>够将当前</a:t>
             </a:r>
             <a:r>
               <a:rPr lang="zh-CN" altLang="en-US" dirty="0"/>
@@ -4126,15 +4200,7 @@
             </a:r>
             <a:r>
               <a:rPr lang="zh-CN" altLang="en-US" dirty="0" smtClean="0"/>
-              <a:t>角</a:t>
-            </a:r>
-            <a:r>
-              <a:rPr lang="zh-CN" altLang="en-US" dirty="0" smtClean="0"/>
-              <a:t>色的用户删</a:t>
-            </a:r>
-            <a:r>
-              <a:rPr lang="zh-CN" altLang="en-US" dirty="0" smtClean="0"/>
-              <a:t>除</a:t>
+              <a:t>角色的用户删除</a:t>
             </a:r>
             <a:endParaRPr lang="en-US" altLang="zh-CN" dirty="0" smtClean="0"/>
           </a:p>
@@ -4353,7 +4419,9 @@
         </p:nvSpPr>
         <p:spPr/>
         <p:txBody>
-          <a:bodyPr/>
+          <a:bodyPr>
+            <a:normAutofit/>
+          </a:bodyPr>
           <a:lstStyle/>
           <a:p>
             <a:r>
@@ -4388,44 +4456,191 @@
             </a:r>
             <a:r>
               <a:rPr lang="zh-CN" altLang="en-US" dirty="0" smtClean="0"/>
-              <a:t>够接受多次邀请成为不同角色</a:t>
-            </a:r>
-            <a:endParaRPr lang="en-US" altLang="zh-CN" dirty="0" smtClean="0"/>
-          </a:p>
-          <a:p>
-            <a:pPr marL="914400" lvl="1" indent="-457200">
+              <a:t>够接受多次邀请成为不同角</a:t>
+            </a:r>
+            <a:r>
+              <a:rPr lang="zh-CN" altLang="en-US" dirty="0" smtClean="0"/>
+              <a:t>色</a:t>
+            </a:r>
+            <a:endParaRPr lang="en-US" altLang="zh-CN" dirty="0" smtClean="0"/>
+          </a:p>
+          <a:p>
+            <a:pPr marL="1371600" lvl="2" indent="-457200">
               <a:buFont typeface="+mj-lt"/>
               <a:buAutoNum type="arabicPeriod"/>
             </a:pPr>
             <a:r>
-              <a:rPr lang="zh-CN" altLang="en-US" dirty="0"/>
-              <a:t>一个</a:t>
-            </a:r>
-            <a:r>
-              <a:rPr lang="zh-CN" altLang="en-US" dirty="0" smtClean="0"/>
-              <a:t>人只能成为一个</a:t>
-            </a:r>
+              <a:rPr lang="en-US" altLang="zh-CN" dirty="0" smtClean="0"/>
+              <a:t>B</a:t>
+            </a:r>
+            <a:r>
+              <a:rPr lang="zh-CN" altLang="en-US" dirty="0" smtClean="0"/>
+              <a:t>角色不可接受其他角色</a:t>
+            </a:r>
+            <a:endParaRPr lang="en-US" altLang="zh-CN" dirty="0" smtClean="0"/>
+          </a:p>
+          <a:p>
+            <a:pPr marL="1371600" lvl="2" indent="-457200">
+              <a:buFont typeface="+mj-lt"/>
+              <a:buAutoNum type="arabicPeriod"/>
+            </a:pPr>
+            <a:r>
+              <a:rPr lang="en-US" altLang="zh-CN" dirty="0" smtClean="0"/>
+              <a:t>C</a:t>
+            </a:r>
+            <a:r>
+              <a:rPr lang="zh-CN" altLang="en-US" dirty="0" smtClean="0"/>
+              <a:t>角色添加到渠道保留组织构（</a:t>
+            </a:r>
+            <a:r>
+              <a:rPr lang="en-US" altLang="zh-CN" dirty="0" smtClean="0"/>
+              <a:t>C-D</a:t>
+            </a:r>
+            <a:r>
+              <a:rPr lang="zh-CN" altLang="en-US" dirty="0" smtClean="0"/>
+              <a:t>）</a:t>
+            </a:r>
+            <a:r>
+              <a:rPr lang="en-US" altLang="zh-CN" dirty="0" smtClean="0"/>
+              <a:t>--</a:t>
+            </a:r>
+            <a:r>
+              <a:rPr lang="zh-CN" altLang="en-US" dirty="0" smtClean="0"/>
+              <a:t>保留名称</a:t>
+            </a:r>
+            <a:r>
+              <a:rPr lang="en-US" altLang="zh-CN" dirty="0" smtClean="0"/>
+              <a:t>— </a:t>
+            </a:r>
+            <a:r>
+              <a:rPr lang="zh-CN" altLang="en-US" dirty="0" smtClean="0"/>
+              <a:t>（</a:t>
+            </a:r>
+            <a:r>
+              <a:rPr lang="en-US" altLang="zh-CN" dirty="0" smtClean="0"/>
+              <a:t>C/D</a:t>
+            </a:r>
+            <a:r>
+              <a:rPr lang="zh-CN" altLang="en-US" dirty="0" smtClean="0"/>
+              <a:t>绑定复制去别的渠道）</a:t>
+            </a:r>
+            <a:endParaRPr lang="en-US" altLang="zh-CN" dirty="0" smtClean="0"/>
+          </a:p>
+          <a:p>
+            <a:pPr marL="1371600" lvl="2" indent="-457200">
+              <a:buFont typeface="+mj-lt"/>
+              <a:buAutoNum type="arabicPeriod"/>
+            </a:pPr>
+            <a:r>
+              <a:rPr lang="en-US" altLang="zh-CN" dirty="0" smtClean="0"/>
+              <a:t>C</a:t>
+            </a:r>
+            <a:r>
+              <a:rPr lang="zh-CN" altLang="en-US" dirty="0" smtClean="0"/>
+              <a:t>角色不可接受其他角色</a:t>
+            </a:r>
+            <a:endParaRPr lang="en-US" altLang="zh-CN" dirty="0" smtClean="0"/>
+          </a:p>
+          <a:p>
+            <a:pPr marL="1371600" lvl="2" indent="-457200">
+              <a:buFont typeface="+mj-lt"/>
+              <a:buAutoNum type="arabicPeriod"/>
+            </a:pPr>
             <a:r>
               <a:rPr lang="en-US" altLang="zh-CN" dirty="0" smtClean="0"/>
               <a:t>D</a:t>
             </a:r>
             <a:r>
               <a:rPr lang="zh-CN" altLang="en-US" dirty="0" smtClean="0"/>
+              <a:t>角色不可接受其他角色（</a:t>
+            </a:r>
+            <a:r>
+              <a:rPr lang="en-US" altLang="zh-CN" dirty="0" smtClean="0"/>
+              <a:t>CD</a:t>
+            </a:r>
+            <a:r>
+              <a:rPr lang="zh-CN" altLang="en-US" dirty="0" smtClean="0"/>
+              <a:t>绑定）</a:t>
+            </a:r>
+            <a:endParaRPr lang="en-US" altLang="zh-CN" dirty="0" smtClean="0"/>
+          </a:p>
+          <a:p>
+            <a:pPr marL="1371600" lvl="2" indent="-457200">
+              <a:buFont typeface="+mj-lt"/>
+              <a:buAutoNum type="arabicPeriod"/>
+            </a:pPr>
+            <a:r>
+              <a:rPr lang="zh-CN" altLang="en-US" dirty="0" smtClean="0"/>
+              <a:t>可以多次接受</a:t>
+            </a:r>
+            <a:r>
+              <a:rPr lang="en-US" altLang="zh-CN" dirty="0" smtClean="0"/>
+              <a:t>E</a:t>
+            </a:r>
+            <a:r>
+              <a:rPr lang="zh-CN" altLang="en-US" dirty="0" smtClean="0"/>
+              <a:t>角色（不显示</a:t>
+            </a:r>
+            <a:r>
+              <a:rPr lang="en-US" altLang="zh-CN" dirty="0" smtClean="0"/>
+              <a:t>D</a:t>
+            </a:r>
+            <a:r>
+              <a:rPr lang="zh-CN" altLang="en-US" dirty="0" smtClean="0"/>
+              <a:t>，只接受</a:t>
+            </a:r>
+            <a:r>
+              <a:rPr lang="zh-CN" altLang="en-US" dirty="0"/>
+              <a:t>促</a:t>
+            </a:r>
+            <a:r>
+              <a:rPr lang="zh-CN" altLang="en-US" dirty="0" smtClean="0"/>
+              <a:t>销活动）</a:t>
+            </a:r>
+            <a:endParaRPr lang="en-US" altLang="zh-CN" dirty="0" smtClean="0"/>
+          </a:p>
+          <a:p>
+            <a:pPr marL="1371600" lvl="2" indent="-457200">
+              <a:buFont typeface="+mj-lt"/>
+              <a:buAutoNum type="arabicPeriod"/>
+            </a:pPr>
+            <a:r>
+              <a:rPr lang="en-US" altLang="zh-CN" dirty="0" smtClean="0"/>
+              <a:t>E</a:t>
+            </a:r>
+            <a:r>
+              <a:rPr lang="zh-CN" altLang="en-US" dirty="0" smtClean="0"/>
+              <a:t>可以</a:t>
+            </a:r>
+            <a:r>
+              <a:rPr lang="zh-CN" altLang="en-US" dirty="0"/>
+              <a:t>成</a:t>
+            </a:r>
+            <a:r>
+              <a:rPr lang="zh-CN" altLang="en-US" dirty="0" smtClean="0"/>
+              <a:t>为</a:t>
+            </a:r>
+            <a:r>
+              <a:rPr lang="en-US" altLang="zh-CN" dirty="0" smtClean="0"/>
+              <a:t>BCD, </a:t>
+            </a:r>
+            <a:r>
+              <a:rPr lang="zh-CN" altLang="en-US" dirty="0"/>
+              <a:t>同</a:t>
+            </a:r>
+            <a:r>
+              <a:rPr lang="zh-CN" altLang="en-US" dirty="0" smtClean="0"/>
+              <a:t>时就失去</a:t>
+            </a:r>
+            <a:r>
+              <a:rPr lang="en-US" altLang="zh-CN" dirty="0" smtClean="0"/>
+              <a:t>E</a:t>
+            </a:r>
+            <a:r>
+              <a:rPr lang="zh-CN" altLang="en-US" dirty="0" smtClean="0"/>
               <a:t>角色</a:t>
             </a:r>
-            <a:r>
-              <a:rPr lang="zh-CN" altLang="en-US" dirty="0" smtClean="0">
-                <a:solidFill>
-                  <a:srgbClr val="FF0000"/>
-                </a:solidFill>
-              </a:rPr>
-              <a:t>（需确认）</a:t>
-            </a:r>
-            <a:endParaRPr lang="en-US" altLang="zh-CN" dirty="0" smtClean="0">
-              <a:solidFill>
-                <a:srgbClr val="FF0000"/>
-              </a:solidFill>
-            </a:endParaRPr>
+            <a:endParaRPr lang="en-US" altLang="zh-CN" dirty="0" smtClean="0"/>
           </a:p>
           <a:p>
             <a:pPr marL="914400" lvl="1" indent="-457200">
@@ -4465,15 +4680,7 @@
                   <a:srgbClr val="FF0000"/>
                 </a:solidFill>
               </a:rPr>
-              <a:t>待</a:t>
-            </a:r>
-            <a:r>
-              <a:rPr lang="zh-CN" altLang="en-US" dirty="0" smtClean="0">
-                <a:solidFill>
-                  <a:srgbClr val="FF0000"/>
-                </a:solidFill>
-              </a:rPr>
-              <a:t>完</a:t>
+              <a:t>待完</a:t>
             </a:r>
             <a:r>
               <a:rPr lang="zh-CN" altLang="en-US" dirty="0">
@@ -7723,7 +7930,15 @@
             </a:pPr>
             <a:r>
               <a:rPr lang="zh-CN" altLang="en-US" dirty="0" smtClean="0"/>
-              <a:t>用户可以注册用户至谭雅系统</a:t>
+              <a:t>用户可以注册用户至谭雅系</a:t>
+            </a:r>
+            <a:r>
+              <a:rPr lang="zh-CN" altLang="en-US" dirty="0" smtClean="0"/>
+              <a:t>统</a:t>
+            </a:r>
+            <a:r>
+              <a:rPr lang="zh-CN" altLang="en-US" dirty="0" smtClean="0"/>
+              <a:t>（公众号入口）</a:t>
             </a:r>
             <a:endParaRPr lang="en-US" altLang="zh-CN" dirty="0" smtClean="0"/>
           </a:p>
@@ -7738,7 +7953,11 @@
             </a:r>
             <a:r>
               <a:rPr lang="zh-CN" altLang="en-US" dirty="0" smtClean="0"/>
-              <a:t>户能够修改密码（发送短信验证码）</a:t>
+              <a:t>户能够修改密码（发送短信验证码</a:t>
+            </a:r>
+            <a:r>
+              <a:rPr lang="zh-CN" altLang="en-US" dirty="0" smtClean="0"/>
+              <a:t>）（微信登录）</a:t>
             </a:r>
             <a:endParaRPr lang="en-US" altLang="zh-CN" dirty="0" smtClean="0"/>
           </a:p>
@@ -7764,19 +7983,7 @@
             </a:pPr>
             <a:r>
               <a:rPr lang="zh-CN" altLang="en-US" dirty="0" smtClean="0"/>
-              <a:t>用户需要输</a:t>
-            </a:r>
-            <a:r>
-              <a:rPr lang="zh-CN" altLang="en-US" dirty="0" smtClean="0"/>
-              <a:t>入个</a:t>
-            </a:r>
-            <a:r>
-              <a:rPr lang="zh-CN" altLang="en-US" dirty="0" smtClean="0"/>
-              <a:t>人信</a:t>
-            </a:r>
-            <a:r>
-              <a:rPr lang="zh-CN" altLang="en-US" dirty="0" smtClean="0"/>
-              <a:t>息</a:t>
+              <a:t>用户需要输入个人信息</a:t>
             </a:r>
             <a:r>
               <a:rPr lang="zh-CN" altLang="en-US" dirty="0">
@@ -7784,8 +7991,68 @@
                   <a:srgbClr val="FF0000"/>
                 </a:solidFill>
               </a:rPr>
-              <a:t>（需定义）</a:t>
-            </a:r>
+              <a:t>（需定义</a:t>
+            </a:r>
+            <a:r>
+              <a:rPr lang="zh-CN" altLang="en-US" dirty="0" smtClean="0">
+                <a:solidFill>
+                  <a:srgbClr val="FF0000"/>
+                </a:solidFill>
+              </a:rPr>
+              <a:t>）</a:t>
+            </a:r>
+            <a:endParaRPr lang="en-US" altLang="zh-CN" dirty="0" smtClean="0">
+              <a:solidFill>
+                <a:srgbClr val="FF0000"/>
+              </a:solidFill>
+            </a:endParaRPr>
+          </a:p>
+          <a:p>
+            <a:pPr marL="1371600" lvl="2" indent="-457200">
+              <a:buFont typeface="+mj-lt"/>
+              <a:buAutoNum type="arabicPeriod"/>
+            </a:pPr>
+            <a:r>
+              <a:rPr lang="zh-CN" altLang="en-US" dirty="0"/>
+              <a:t>姓</a:t>
+            </a:r>
+            <a:r>
+              <a:rPr lang="zh-CN" altLang="en-US" dirty="0" smtClean="0"/>
+              <a:t>名</a:t>
+            </a:r>
+            <a:endParaRPr lang="en-US" altLang="zh-CN" dirty="0" smtClean="0"/>
+          </a:p>
+          <a:p>
+            <a:pPr marL="1371600" lvl="2" indent="-457200">
+              <a:buFont typeface="+mj-lt"/>
+              <a:buAutoNum type="arabicPeriod"/>
+            </a:pPr>
+            <a:r>
+              <a:rPr lang="zh-CN" altLang="en-US" dirty="0"/>
+              <a:t>联</a:t>
+            </a:r>
+            <a:r>
+              <a:rPr lang="zh-CN" altLang="en-US" dirty="0" smtClean="0"/>
+              <a:t>系方式</a:t>
+            </a:r>
+            <a:endParaRPr lang="en-US" altLang="zh-CN" dirty="0" smtClean="0"/>
+          </a:p>
+          <a:p>
+            <a:pPr marL="1371600" lvl="2" indent="-457200">
+              <a:buFont typeface="+mj-lt"/>
+              <a:buAutoNum type="arabicPeriod"/>
+            </a:pPr>
+            <a:r>
+              <a:rPr lang="zh-CN" altLang="en-US" dirty="0" smtClean="0"/>
+              <a:t>邮箱</a:t>
+            </a:r>
+            <a:endParaRPr lang="en-US" altLang="zh-CN" dirty="0" smtClean="0"/>
+          </a:p>
+          <a:p>
+            <a:pPr marL="1371600" lvl="2" indent="-457200">
+              <a:buFont typeface="+mj-lt"/>
+              <a:buAutoNum type="arabicPeriod"/>
+            </a:pPr>
             <a:endParaRPr lang="en-US" altLang="zh-CN" dirty="0"/>
           </a:p>
           <a:p>
@@ -8199,11 +8466,7 @@
             </a:r>
             <a:r>
               <a:rPr lang="zh-CN" altLang="en-US" dirty="0" smtClean="0"/>
-              <a:t>是否需要有效期设</a:t>
-            </a:r>
-            <a:r>
-              <a:rPr lang="zh-CN" altLang="en-US" dirty="0" smtClean="0"/>
-              <a:t>置</a:t>
+              <a:t>是否需要有效期设置</a:t>
             </a:r>
             <a:endParaRPr lang="en-US" altLang="zh-CN" dirty="0" smtClean="0"/>
           </a:p>
@@ -8241,11 +8504,7 @@
             </a:r>
             <a:r>
               <a:rPr lang="zh-CN" altLang="en-US" dirty="0" smtClean="0"/>
-              <a:t>都可</a:t>
-            </a:r>
-            <a:r>
-              <a:rPr lang="zh-CN" altLang="en-US" dirty="0" smtClean="0"/>
-              <a:t>见</a:t>
+              <a:t>都可见</a:t>
             </a:r>
             <a:endParaRPr lang="en-US" altLang="zh-CN" dirty="0" smtClean="0"/>
           </a:p>
@@ -8850,11 +9109,7 @@
             </a:r>
             <a:r>
               <a:rPr lang="zh-CN" altLang="en-US" dirty="0" smtClean="0"/>
-              <a:t>：能够创</a:t>
-            </a:r>
-            <a:r>
-              <a:rPr lang="zh-CN" altLang="en-US" dirty="0" smtClean="0"/>
-              <a:t>建</a:t>
+              <a:t>：能够创建</a:t>
             </a:r>
             <a:r>
               <a:rPr lang="en-US" altLang="zh-CN" dirty="0"/>
@@ -8866,11 +9121,7 @@
             </a:r>
             <a:r>
               <a:rPr lang="zh-CN" altLang="en-US" dirty="0" smtClean="0"/>
-              <a:t>理</a:t>
-            </a:r>
-            <a:r>
-              <a:rPr lang="zh-CN" altLang="en-US" dirty="0" smtClean="0"/>
-              <a:t>员角色</a:t>
+              <a:t>理员角色</a:t>
             </a:r>
             <a:endParaRPr lang="en-US" altLang="zh-CN" dirty="0"/>
           </a:p>
@@ -8882,11 +9133,7 @@
             </a:r>
             <a:r>
               <a:rPr lang="zh-CN" altLang="en-US" dirty="0" smtClean="0"/>
-              <a:t>：提供创</a:t>
-            </a:r>
-            <a:r>
-              <a:rPr lang="zh-CN" altLang="en-US" dirty="0" smtClean="0"/>
-              <a:t>建</a:t>
+              <a:t>：提供创建</a:t>
             </a:r>
             <a:r>
               <a:rPr lang="en-US" altLang="zh-CN" dirty="0"/>
@@ -9012,11 +9259,7 @@
             </a:r>
             <a:r>
               <a:rPr lang="zh-CN" altLang="en-US" dirty="0" smtClean="0"/>
-              <a:t>够邀请系统中已有用户通过固定连接加入该角</a:t>
-            </a:r>
-            <a:r>
-              <a:rPr lang="zh-CN" altLang="en-US" dirty="0" smtClean="0"/>
-              <a:t>色</a:t>
+              <a:t>够邀请系统中已有用户通过固定连接加入该角色</a:t>
             </a:r>
             <a:endParaRPr lang="en-US" altLang="zh-CN" dirty="0" smtClean="0"/>
           </a:p>
@@ -9127,11 +9370,7 @@
           <a:p>
             <a:r>
               <a:rPr lang="zh-CN" altLang="en-US" dirty="0" smtClean="0"/>
-              <a:t>管</a:t>
-            </a:r>
-            <a:r>
-              <a:rPr lang="zh-CN" altLang="en-US" dirty="0" smtClean="0"/>
-              <a:t>理员</a:t>
+              <a:t>管理员</a:t>
             </a:r>
             <a:endParaRPr lang="zh-CN" altLang="en-US" dirty="0"/>
           </a:p>
@@ -9166,11 +9405,7 @@
             </a:r>
             <a:r>
               <a:rPr lang="zh-CN" altLang="en-US" dirty="0" smtClean="0"/>
-              <a:t>：管</a:t>
-            </a:r>
-            <a:r>
-              <a:rPr lang="zh-CN" altLang="en-US" dirty="0" smtClean="0"/>
-              <a:t>理员</a:t>
+              <a:t>：管理员</a:t>
             </a:r>
             <a:endParaRPr lang="en-US" altLang="zh-CN" dirty="0"/>
           </a:p>
@@ -9182,11 +9417,7 @@
             </a:r>
             <a:r>
               <a:rPr lang="zh-CN" altLang="en-US" dirty="0" smtClean="0"/>
-              <a:t>：能</a:t>
-            </a:r>
-            <a:r>
-              <a:rPr lang="zh-CN" altLang="en-US" dirty="0" smtClean="0"/>
-              <a:t>够</a:t>
+              <a:t>：能够</a:t>
             </a:r>
             <a:r>
               <a:rPr lang="zh-CN" altLang="en-US" dirty="0"/>
@@ -9218,11 +9449,7 @@
             </a:r>
             <a:r>
               <a:rPr lang="zh-CN" altLang="en-US" dirty="0" smtClean="0"/>
-              <a:t>：提供创</a:t>
-            </a:r>
-            <a:r>
-              <a:rPr lang="zh-CN" altLang="en-US" dirty="0" smtClean="0"/>
-              <a:t>建</a:t>
+              <a:t>：提供创建</a:t>
             </a:r>
             <a:r>
               <a:rPr lang="en-US" altLang="zh-CN" dirty="0"/>
@@ -9303,11 +9530,7 @@
           <a:p>
             <a:r>
               <a:rPr lang="zh-CN" altLang="en-US" dirty="0" smtClean="0"/>
-              <a:t>管</a:t>
-            </a:r>
-            <a:r>
-              <a:rPr lang="zh-CN" altLang="en-US" dirty="0" smtClean="0"/>
-              <a:t>理员</a:t>
+              <a:t>管理员</a:t>
             </a:r>
             <a:endParaRPr lang="zh-CN" altLang="en-US" dirty="0"/>
           </a:p>
@@ -9345,11 +9568,7 @@
             </a:r>
             <a:r>
               <a:rPr lang="zh-CN" altLang="en-US" dirty="0" smtClean="0"/>
-              <a:t>够创</a:t>
-            </a:r>
-            <a:r>
-              <a:rPr lang="zh-CN" altLang="en-US" dirty="0" smtClean="0"/>
-              <a:t>建</a:t>
+              <a:t>够创建</a:t>
             </a:r>
             <a:r>
               <a:rPr lang="zh-CN" altLang="en-US" dirty="0"/>
@@ -9357,11 +9576,7 @@
             </a:r>
             <a:r>
               <a:rPr lang="zh-CN" altLang="en-US" dirty="0" smtClean="0"/>
-              <a:t>角</a:t>
-            </a:r>
-            <a:r>
-              <a:rPr lang="zh-CN" altLang="en-US" dirty="0" smtClean="0"/>
-              <a:t>色</a:t>
+              <a:t>角色</a:t>
             </a:r>
             <a:endParaRPr lang="en-US" altLang="zh-CN" dirty="0" smtClean="0"/>
           </a:p>
@@ -9376,11 +9591,7 @@
             </a:r>
             <a:r>
               <a:rPr lang="zh-CN" altLang="en-US" dirty="0" smtClean="0"/>
-              <a:t>够邀请系统中已有用户通过固定连接加入该角</a:t>
-            </a:r>
-            <a:r>
-              <a:rPr lang="zh-CN" altLang="en-US" dirty="0" smtClean="0"/>
-              <a:t>色</a:t>
+              <a:t>够邀请系统中已有用户通过固定连接加入该角色</a:t>
             </a:r>
             <a:endParaRPr lang="en-US" altLang="zh-CN" dirty="0" smtClean="0"/>
           </a:p>
@@ -9411,7 +9622,61 @@
                   <a:srgbClr val="FF0000"/>
                 </a:solidFill>
               </a:rPr>
-              <a:t>（需定义）</a:t>
+              <a:t>（需定义</a:t>
+            </a:r>
+            <a:r>
+              <a:rPr lang="zh-CN" altLang="en-US" dirty="0" smtClean="0">
+                <a:solidFill>
+                  <a:srgbClr val="FF0000"/>
+                </a:solidFill>
+              </a:rPr>
+              <a:t>）</a:t>
+            </a:r>
+            <a:endParaRPr lang="en-US" altLang="zh-CN" dirty="0" smtClean="0">
+              <a:solidFill>
+                <a:srgbClr val="FF0000"/>
+              </a:solidFill>
+            </a:endParaRPr>
+          </a:p>
+          <a:p>
+            <a:pPr marL="1371600" lvl="2" indent="-457200">
+              <a:buFont typeface="+mj-lt"/>
+              <a:buAutoNum type="arabicPeriod"/>
+            </a:pPr>
+            <a:r>
+              <a:rPr lang="zh-CN" altLang="en-US" dirty="0">
+                <a:solidFill>
+                  <a:srgbClr val="FF0000"/>
+                </a:solidFill>
+              </a:rPr>
+              <a:t>公</a:t>
+            </a:r>
+            <a:r>
+              <a:rPr lang="zh-CN" altLang="en-US" dirty="0" smtClean="0">
+                <a:solidFill>
+                  <a:srgbClr val="FF0000"/>
+                </a:solidFill>
+              </a:rPr>
+              <a:t>司名称</a:t>
+            </a:r>
+            <a:endParaRPr lang="en-US" altLang="zh-CN" dirty="0" smtClean="0">
+              <a:solidFill>
+                <a:srgbClr val="FF0000"/>
+              </a:solidFill>
+            </a:endParaRPr>
+          </a:p>
+          <a:p>
+            <a:pPr marL="1371600" lvl="2" indent="-457200">
+              <a:buFont typeface="+mj-lt"/>
+              <a:buAutoNum type="arabicPeriod"/>
+            </a:pPr>
+            <a:r>
+              <a:rPr lang="zh-CN" altLang="en-US" dirty="0">
+                <a:solidFill>
+                  <a:srgbClr val="FF0000"/>
+                </a:solidFill>
+              </a:rPr>
+              <a:t>有效期</a:t>
             </a:r>
             <a:endParaRPr lang="en-US" altLang="zh-CN" dirty="0" smtClean="0">
               <a:solidFill>
@@ -9516,7 +9781,6 @@
               <a:rPr lang="zh-CN" altLang="en-US" dirty="0"/>
               <a:t>商务公司（渠道）</a:t>
             </a:r>
-            <a:endParaRPr lang="zh-CN" altLang="en-US" dirty="0"/>
           </a:p>
         </p:txBody>
       </p:sp>
@@ -9561,11 +9825,7 @@
             <a:pPr lvl="1"/>
             <a:r>
               <a:rPr lang="zh-CN" altLang="en-US" dirty="0" smtClean="0"/>
-              <a:t>为了：能够</a:t>
-            </a:r>
-            <a:r>
-              <a:rPr lang="zh-CN" altLang="en-US" dirty="0" smtClean="0"/>
-              <a:t>创建</a:t>
+              <a:t>为了：能够创建</a:t>
             </a:r>
             <a:r>
               <a:rPr lang="en-US" altLang="zh-CN" dirty="0"/>
@@ -9593,11 +9853,7 @@
             </a:r>
             <a:r>
               <a:rPr lang="zh-CN" altLang="en-US" dirty="0" smtClean="0"/>
-              <a:t>：提供创</a:t>
-            </a:r>
-            <a:r>
-              <a:rPr lang="zh-CN" altLang="en-US" dirty="0" smtClean="0"/>
-              <a:t>建</a:t>
+              <a:t>：提供创建</a:t>
             </a:r>
             <a:r>
               <a:rPr lang="en-US" altLang="zh-CN" dirty="0"/>

</xml_diff>